<commit_message>
Version: 1.1.0.11 Änderungen: Präüsentation angepasst
</commit_message>
<xml_diff>
--- a/share/presentations/Java_1/Abschlusspraesentation.pptx
+++ b/share/presentations/Java_1/Abschlusspraesentation.pptx
@@ -148,7 +148,7 @@
           <p:cNvPr id="2" name="Titel 1">
             <a:extLst>
               <a:ext uri="{FF2B5EF4-FFF2-40B4-BE49-F238E27FC236}">
-                <a16:creationId xmlns:a16="http://schemas.microsoft.com/office/drawing/2014/main" xmlns="" id="{749852C9-6766-40F6-A76A-1823904D0632}"/>
+                <a16:creationId xmlns:a16="http://schemas.microsoft.com/office/drawing/2014/main" id="{749852C9-6766-40F6-A76A-1823904D0632}"/>
               </a:ext>
             </a:extLst>
           </p:cNvPr>
@@ -185,7 +185,7 @@
           <p:cNvPr id="3" name="Untertitel 2">
             <a:extLst>
               <a:ext uri="{FF2B5EF4-FFF2-40B4-BE49-F238E27FC236}">
-                <a16:creationId xmlns:a16="http://schemas.microsoft.com/office/drawing/2014/main" xmlns="" id="{84696DF9-9E3C-4175-87B4-F40B284B642A}"/>
+                <a16:creationId xmlns:a16="http://schemas.microsoft.com/office/drawing/2014/main" id="{84696DF9-9E3C-4175-87B4-F40B284B642A}"/>
               </a:ext>
             </a:extLst>
           </p:cNvPr>
@@ -255,7 +255,7 @@
           <p:cNvPr id="4" name="Datumsplatzhalter 3">
             <a:extLst>
               <a:ext uri="{FF2B5EF4-FFF2-40B4-BE49-F238E27FC236}">
-                <a16:creationId xmlns:a16="http://schemas.microsoft.com/office/drawing/2014/main" xmlns="" id="{22A8C0FF-0B1D-4155-B49C-372CF1098338}"/>
+                <a16:creationId xmlns:a16="http://schemas.microsoft.com/office/drawing/2014/main" id="{22A8C0FF-0B1D-4155-B49C-372CF1098338}"/>
               </a:ext>
             </a:extLst>
           </p:cNvPr>
@@ -273,7 +273,7 @@
           <a:p>
             <a:fld id="{61DCF2AA-3565-4A8F-AEB7-BBCC4D9D8BE9}" type="datetimeFigureOut">
               <a:rPr lang="de-DE" smtClean="0"/>
-              <a:t>28.01.2021</a:t>
+              <a:t>29.01.2021</a:t>
             </a:fld>
             <a:endParaRPr lang="de-DE"/>
           </a:p>
@@ -284,7 +284,7 @@
           <p:cNvPr id="5" name="Fußzeilenplatzhalter 4">
             <a:extLst>
               <a:ext uri="{FF2B5EF4-FFF2-40B4-BE49-F238E27FC236}">
-                <a16:creationId xmlns:a16="http://schemas.microsoft.com/office/drawing/2014/main" xmlns="" id="{859C3D7A-4FCE-4082-9C5D-B1824B145A16}"/>
+                <a16:creationId xmlns:a16="http://schemas.microsoft.com/office/drawing/2014/main" id="{859C3D7A-4FCE-4082-9C5D-B1824B145A16}"/>
               </a:ext>
             </a:extLst>
           </p:cNvPr>
@@ -309,7 +309,7 @@
           <p:cNvPr id="6" name="Foliennummernplatzhalter 5">
             <a:extLst>
               <a:ext uri="{FF2B5EF4-FFF2-40B4-BE49-F238E27FC236}">
-                <a16:creationId xmlns:a16="http://schemas.microsoft.com/office/drawing/2014/main" xmlns="" id="{2CB829E3-DD1B-4200-AD0E-6CF1409A33DF}"/>
+                <a16:creationId xmlns:a16="http://schemas.microsoft.com/office/drawing/2014/main" id="{2CB829E3-DD1B-4200-AD0E-6CF1409A33DF}"/>
               </a:ext>
             </a:extLst>
           </p:cNvPr>
@@ -368,7 +368,7 @@
           <p:cNvPr id="2" name="Titel 1">
             <a:extLst>
               <a:ext uri="{FF2B5EF4-FFF2-40B4-BE49-F238E27FC236}">
-                <a16:creationId xmlns:a16="http://schemas.microsoft.com/office/drawing/2014/main" xmlns="" id="{20408729-4FE7-4F3B-A187-C3202D9A7887}"/>
+                <a16:creationId xmlns:a16="http://schemas.microsoft.com/office/drawing/2014/main" id="{20408729-4FE7-4F3B-A187-C3202D9A7887}"/>
               </a:ext>
             </a:extLst>
           </p:cNvPr>
@@ -396,7 +396,7 @@
           <p:cNvPr id="3" name="Vertikaler Textplatzhalter 2">
             <a:extLst>
               <a:ext uri="{FF2B5EF4-FFF2-40B4-BE49-F238E27FC236}">
-                <a16:creationId xmlns:a16="http://schemas.microsoft.com/office/drawing/2014/main" xmlns="" id="{E4C61A44-25D7-4581-B2D5-08BE2035A5E0}"/>
+                <a16:creationId xmlns:a16="http://schemas.microsoft.com/office/drawing/2014/main" id="{E4C61A44-25D7-4581-B2D5-08BE2035A5E0}"/>
               </a:ext>
             </a:extLst>
           </p:cNvPr>
@@ -453,7 +453,7 @@
           <p:cNvPr id="4" name="Datumsplatzhalter 3">
             <a:extLst>
               <a:ext uri="{FF2B5EF4-FFF2-40B4-BE49-F238E27FC236}">
-                <a16:creationId xmlns:a16="http://schemas.microsoft.com/office/drawing/2014/main" xmlns="" id="{2FC1FB87-FE7A-4046-A06A-86109B44BEE5}"/>
+                <a16:creationId xmlns:a16="http://schemas.microsoft.com/office/drawing/2014/main" id="{2FC1FB87-FE7A-4046-A06A-86109B44BEE5}"/>
               </a:ext>
             </a:extLst>
           </p:cNvPr>
@@ -471,7 +471,7 @@
           <a:p>
             <a:fld id="{61DCF2AA-3565-4A8F-AEB7-BBCC4D9D8BE9}" type="datetimeFigureOut">
               <a:rPr lang="de-DE" smtClean="0"/>
-              <a:t>28.01.2021</a:t>
+              <a:t>29.01.2021</a:t>
             </a:fld>
             <a:endParaRPr lang="de-DE"/>
           </a:p>
@@ -482,7 +482,7 @@
           <p:cNvPr id="5" name="Fußzeilenplatzhalter 4">
             <a:extLst>
               <a:ext uri="{FF2B5EF4-FFF2-40B4-BE49-F238E27FC236}">
-                <a16:creationId xmlns:a16="http://schemas.microsoft.com/office/drawing/2014/main" xmlns="" id="{31322ABB-364D-4334-A0C4-577F5CC7DA09}"/>
+                <a16:creationId xmlns:a16="http://schemas.microsoft.com/office/drawing/2014/main" id="{31322ABB-364D-4334-A0C4-577F5CC7DA09}"/>
               </a:ext>
             </a:extLst>
           </p:cNvPr>
@@ -507,7 +507,7 @@
           <p:cNvPr id="6" name="Foliennummernplatzhalter 5">
             <a:extLst>
               <a:ext uri="{FF2B5EF4-FFF2-40B4-BE49-F238E27FC236}">
-                <a16:creationId xmlns:a16="http://schemas.microsoft.com/office/drawing/2014/main" xmlns="" id="{B5348174-1B48-4465-BDF7-E5C24D2F0A15}"/>
+                <a16:creationId xmlns:a16="http://schemas.microsoft.com/office/drawing/2014/main" id="{B5348174-1B48-4465-BDF7-E5C24D2F0A15}"/>
               </a:ext>
             </a:extLst>
           </p:cNvPr>
@@ -566,7 +566,7 @@
           <p:cNvPr id="2" name="Vertikaler Titel 1">
             <a:extLst>
               <a:ext uri="{FF2B5EF4-FFF2-40B4-BE49-F238E27FC236}">
-                <a16:creationId xmlns:a16="http://schemas.microsoft.com/office/drawing/2014/main" xmlns="" id="{FE9F0434-B03A-46F6-A67B-A86B80F4CF97}"/>
+                <a16:creationId xmlns:a16="http://schemas.microsoft.com/office/drawing/2014/main" id="{FE9F0434-B03A-46F6-A67B-A86B80F4CF97}"/>
               </a:ext>
             </a:extLst>
           </p:cNvPr>
@@ -599,7 +599,7 @@
           <p:cNvPr id="3" name="Vertikaler Textplatzhalter 2">
             <a:extLst>
               <a:ext uri="{FF2B5EF4-FFF2-40B4-BE49-F238E27FC236}">
-                <a16:creationId xmlns:a16="http://schemas.microsoft.com/office/drawing/2014/main" xmlns="" id="{5E814769-B276-4D45-AC35-8FEFA148E70B}"/>
+                <a16:creationId xmlns:a16="http://schemas.microsoft.com/office/drawing/2014/main" id="{5E814769-B276-4D45-AC35-8FEFA148E70B}"/>
               </a:ext>
             </a:extLst>
           </p:cNvPr>
@@ -661,7 +661,7 @@
           <p:cNvPr id="4" name="Datumsplatzhalter 3">
             <a:extLst>
               <a:ext uri="{FF2B5EF4-FFF2-40B4-BE49-F238E27FC236}">
-                <a16:creationId xmlns:a16="http://schemas.microsoft.com/office/drawing/2014/main" xmlns="" id="{9EAF7671-1FE1-4A54-89C0-79145E08AAC6}"/>
+                <a16:creationId xmlns:a16="http://schemas.microsoft.com/office/drawing/2014/main" id="{9EAF7671-1FE1-4A54-89C0-79145E08AAC6}"/>
               </a:ext>
             </a:extLst>
           </p:cNvPr>
@@ -679,7 +679,7 @@
           <a:p>
             <a:fld id="{61DCF2AA-3565-4A8F-AEB7-BBCC4D9D8BE9}" type="datetimeFigureOut">
               <a:rPr lang="de-DE" smtClean="0"/>
-              <a:t>28.01.2021</a:t>
+              <a:t>29.01.2021</a:t>
             </a:fld>
             <a:endParaRPr lang="de-DE"/>
           </a:p>
@@ -690,7 +690,7 @@
           <p:cNvPr id="5" name="Fußzeilenplatzhalter 4">
             <a:extLst>
               <a:ext uri="{FF2B5EF4-FFF2-40B4-BE49-F238E27FC236}">
-                <a16:creationId xmlns:a16="http://schemas.microsoft.com/office/drawing/2014/main" xmlns="" id="{0ECB2645-CC4D-4C9F-BCF4-499E65CA6AD4}"/>
+                <a16:creationId xmlns:a16="http://schemas.microsoft.com/office/drawing/2014/main" id="{0ECB2645-CC4D-4C9F-BCF4-499E65CA6AD4}"/>
               </a:ext>
             </a:extLst>
           </p:cNvPr>
@@ -715,7 +715,7 @@
           <p:cNvPr id="6" name="Foliennummernplatzhalter 5">
             <a:extLst>
               <a:ext uri="{FF2B5EF4-FFF2-40B4-BE49-F238E27FC236}">
-                <a16:creationId xmlns:a16="http://schemas.microsoft.com/office/drawing/2014/main" xmlns="" id="{79770A41-E211-4A28-856D-B48BCA6DD7F5}"/>
+                <a16:creationId xmlns:a16="http://schemas.microsoft.com/office/drawing/2014/main" id="{79770A41-E211-4A28-856D-B48BCA6DD7F5}"/>
               </a:ext>
             </a:extLst>
           </p:cNvPr>
@@ -774,7 +774,7 @@
           <p:cNvPr id="2" name="Titel 1">
             <a:extLst>
               <a:ext uri="{FF2B5EF4-FFF2-40B4-BE49-F238E27FC236}">
-                <a16:creationId xmlns:a16="http://schemas.microsoft.com/office/drawing/2014/main" xmlns="" id="{01ABC3D0-A9A2-4E67-A360-675E655C1C91}"/>
+                <a16:creationId xmlns:a16="http://schemas.microsoft.com/office/drawing/2014/main" id="{01ABC3D0-A9A2-4E67-A360-675E655C1C91}"/>
               </a:ext>
             </a:extLst>
           </p:cNvPr>
@@ -802,7 +802,7 @@
           <p:cNvPr id="3" name="Inhaltsplatzhalter 2">
             <a:extLst>
               <a:ext uri="{FF2B5EF4-FFF2-40B4-BE49-F238E27FC236}">
-                <a16:creationId xmlns:a16="http://schemas.microsoft.com/office/drawing/2014/main" xmlns="" id="{9697AA13-4A14-428C-89BD-1F99C4A37B67}"/>
+                <a16:creationId xmlns:a16="http://schemas.microsoft.com/office/drawing/2014/main" id="{9697AA13-4A14-428C-89BD-1F99C4A37B67}"/>
               </a:ext>
             </a:extLst>
           </p:cNvPr>
@@ -859,7 +859,7 @@
           <p:cNvPr id="4" name="Datumsplatzhalter 3">
             <a:extLst>
               <a:ext uri="{FF2B5EF4-FFF2-40B4-BE49-F238E27FC236}">
-                <a16:creationId xmlns:a16="http://schemas.microsoft.com/office/drawing/2014/main" xmlns="" id="{78571E9B-70FB-49F3-8FD7-8709E6540CD5}"/>
+                <a16:creationId xmlns:a16="http://schemas.microsoft.com/office/drawing/2014/main" id="{78571E9B-70FB-49F3-8FD7-8709E6540CD5}"/>
               </a:ext>
             </a:extLst>
           </p:cNvPr>
@@ -877,7 +877,7 @@
           <a:p>
             <a:fld id="{61DCF2AA-3565-4A8F-AEB7-BBCC4D9D8BE9}" type="datetimeFigureOut">
               <a:rPr lang="de-DE" smtClean="0"/>
-              <a:t>28.01.2021</a:t>
+              <a:t>29.01.2021</a:t>
             </a:fld>
             <a:endParaRPr lang="de-DE"/>
           </a:p>
@@ -888,7 +888,7 @@
           <p:cNvPr id="5" name="Fußzeilenplatzhalter 4">
             <a:extLst>
               <a:ext uri="{FF2B5EF4-FFF2-40B4-BE49-F238E27FC236}">
-                <a16:creationId xmlns:a16="http://schemas.microsoft.com/office/drawing/2014/main" xmlns="" id="{62D44215-0D81-4239-8A9B-EAC595B16DD1}"/>
+                <a16:creationId xmlns:a16="http://schemas.microsoft.com/office/drawing/2014/main" id="{62D44215-0D81-4239-8A9B-EAC595B16DD1}"/>
               </a:ext>
             </a:extLst>
           </p:cNvPr>
@@ -913,7 +913,7 @@
           <p:cNvPr id="6" name="Foliennummernplatzhalter 5">
             <a:extLst>
               <a:ext uri="{FF2B5EF4-FFF2-40B4-BE49-F238E27FC236}">
-                <a16:creationId xmlns:a16="http://schemas.microsoft.com/office/drawing/2014/main" xmlns="" id="{B1D3AE09-17BC-482A-AC00-A9E5D478D62B}"/>
+                <a16:creationId xmlns:a16="http://schemas.microsoft.com/office/drawing/2014/main" id="{B1D3AE09-17BC-482A-AC00-A9E5D478D62B}"/>
               </a:ext>
             </a:extLst>
           </p:cNvPr>
@@ -972,7 +972,7 @@
           <p:cNvPr id="2" name="Titel 1">
             <a:extLst>
               <a:ext uri="{FF2B5EF4-FFF2-40B4-BE49-F238E27FC236}">
-                <a16:creationId xmlns:a16="http://schemas.microsoft.com/office/drawing/2014/main" xmlns="" id="{CF9953CC-AF2D-45ED-804C-9DB34BB920E7}"/>
+                <a16:creationId xmlns:a16="http://schemas.microsoft.com/office/drawing/2014/main" id="{CF9953CC-AF2D-45ED-804C-9DB34BB920E7}"/>
               </a:ext>
             </a:extLst>
           </p:cNvPr>
@@ -1009,7 +1009,7 @@
           <p:cNvPr id="3" name="Textplatzhalter 2">
             <a:extLst>
               <a:ext uri="{FF2B5EF4-FFF2-40B4-BE49-F238E27FC236}">
-                <a16:creationId xmlns:a16="http://schemas.microsoft.com/office/drawing/2014/main" xmlns="" id="{BF7F2DE9-D678-4A1D-94B5-FA0E9E0B3006}"/>
+                <a16:creationId xmlns:a16="http://schemas.microsoft.com/office/drawing/2014/main" id="{BF7F2DE9-D678-4A1D-94B5-FA0E9E0B3006}"/>
               </a:ext>
             </a:extLst>
           </p:cNvPr>
@@ -1134,7 +1134,7 @@
           <p:cNvPr id="4" name="Datumsplatzhalter 3">
             <a:extLst>
               <a:ext uri="{FF2B5EF4-FFF2-40B4-BE49-F238E27FC236}">
-                <a16:creationId xmlns:a16="http://schemas.microsoft.com/office/drawing/2014/main" xmlns="" id="{5D8FF689-0E70-4FFE-80C6-CFDF7FFD5215}"/>
+                <a16:creationId xmlns:a16="http://schemas.microsoft.com/office/drawing/2014/main" id="{5D8FF689-0E70-4FFE-80C6-CFDF7FFD5215}"/>
               </a:ext>
             </a:extLst>
           </p:cNvPr>
@@ -1152,7 +1152,7 @@
           <a:p>
             <a:fld id="{61DCF2AA-3565-4A8F-AEB7-BBCC4D9D8BE9}" type="datetimeFigureOut">
               <a:rPr lang="de-DE" smtClean="0"/>
-              <a:t>28.01.2021</a:t>
+              <a:t>29.01.2021</a:t>
             </a:fld>
             <a:endParaRPr lang="de-DE"/>
           </a:p>
@@ -1163,7 +1163,7 @@
           <p:cNvPr id="5" name="Fußzeilenplatzhalter 4">
             <a:extLst>
               <a:ext uri="{FF2B5EF4-FFF2-40B4-BE49-F238E27FC236}">
-                <a16:creationId xmlns:a16="http://schemas.microsoft.com/office/drawing/2014/main" xmlns="" id="{05208D7A-55E0-4798-8F89-265798037C9F}"/>
+                <a16:creationId xmlns:a16="http://schemas.microsoft.com/office/drawing/2014/main" id="{05208D7A-55E0-4798-8F89-265798037C9F}"/>
               </a:ext>
             </a:extLst>
           </p:cNvPr>
@@ -1188,7 +1188,7 @@
           <p:cNvPr id="6" name="Foliennummernplatzhalter 5">
             <a:extLst>
               <a:ext uri="{FF2B5EF4-FFF2-40B4-BE49-F238E27FC236}">
-                <a16:creationId xmlns:a16="http://schemas.microsoft.com/office/drawing/2014/main" xmlns="" id="{B521EA9F-B5F1-4F45-B945-234EBAD958D2}"/>
+                <a16:creationId xmlns:a16="http://schemas.microsoft.com/office/drawing/2014/main" id="{B521EA9F-B5F1-4F45-B945-234EBAD958D2}"/>
               </a:ext>
             </a:extLst>
           </p:cNvPr>
@@ -1247,7 +1247,7 @@
           <p:cNvPr id="2" name="Titel 1">
             <a:extLst>
               <a:ext uri="{FF2B5EF4-FFF2-40B4-BE49-F238E27FC236}">
-                <a16:creationId xmlns:a16="http://schemas.microsoft.com/office/drawing/2014/main" xmlns="" id="{4D7D0C0A-326E-42F4-AD94-A52C6E0CBC24}"/>
+                <a16:creationId xmlns:a16="http://schemas.microsoft.com/office/drawing/2014/main" id="{4D7D0C0A-326E-42F4-AD94-A52C6E0CBC24}"/>
               </a:ext>
             </a:extLst>
           </p:cNvPr>
@@ -1275,7 +1275,7 @@
           <p:cNvPr id="3" name="Inhaltsplatzhalter 2">
             <a:extLst>
               <a:ext uri="{FF2B5EF4-FFF2-40B4-BE49-F238E27FC236}">
-                <a16:creationId xmlns:a16="http://schemas.microsoft.com/office/drawing/2014/main" xmlns="" id="{6F03BB3B-FFDF-4BA4-8E57-DACC157C6135}"/>
+                <a16:creationId xmlns:a16="http://schemas.microsoft.com/office/drawing/2014/main" id="{6F03BB3B-FFDF-4BA4-8E57-DACC157C6135}"/>
               </a:ext>
             </a:extLst>
           </p:cNvPr>
@@ -1337,7 +1337,7 @@
           <p:cNvPr id="4" name="Inhaltsplatzhalter 3">
             <a:extLst>
               <a:ext uri="{FF2B5EF4-FFF2-40B4-BE49-F238E27FC236}">
-                <a16:creationId xmlns:a16="http://schemas.microsoft.com/office/drawing/2014/main" xmlns="" id="{D6D4CE00-0234-41A3-B192-A824FAEA2418}"/>
+                <a16:creationId xmlns:a16="http://schemas.microsoft.com/office/drawing/2014/main" id="{D6D4CE00-0234-41A3-B192-A824FAEA2418}"/>
               </a:ext>
             </a:extLst>
           </p:cNvPr>
@@ -1399,7 +1399,7 @@
           <p:cNvPr id="5" name="Datumsplatzhalter 4">
             <a:extLst>
               <a:ext uri="{FF2B5EF4-FFF2-40B4-BE49-F238E27FC236}">
-                <a16:creationId xmlns:a16="http://schemas.microsoft.com/office/drawing/2014/main" xmlns="" id="{66922E38-E20D-4B79-8A52-58F8A21B34E0}"/>
+                <a16:creationId xmlns:a16="http://schemas.microsoft.com/office/drawing/2014/main" id="{66922E38-E20D-4B79-8A52-58F8A21B34E0}"/>
               </a:ext>
             </a:extLst>
           </p:cNvPr>
@@ -1417,7 +1417,7 @@
           <a:p>
             <a:fld id="{61DCF2AA-3565-4A8F-AEB7-BBCC4D9D8BE9}" type="datetimeFigureOut">
               <a:rPr lang="de-DE" smtClean="0"/>
-              <a:t>28.01.2021</a:t>
+              <a:t>29.01.2021</a:t>
             </a:fld>
             <a:endParaRPr lang="de-DE"/>
           </a:p>
@@ -1428,7 +1428,7 @@
           <p:cNvPr id="6" name="Fußzeilenplatzhalter 5">
             <a:extLst>
               <a:ext uri="{FF2B5EF4-FFF2-40B4-BE49-F238E27FC236}">
-                <a16:creationId xmlns:a16="http://schemas.microsoft.com/office/drawing/2014/main" xmlns="" id="{415784A4-4B8F-4C15-8604-81A9C0C1DF74}"/>
+                <a16:creationId xmlns:a16="http://schemas.microsoft.com/office/drawing/2014/main" id="{415784A4-4B8F-4C15-8604-81A9C0C1DF74}"/>
               </a:ext>
             </a:extLst>
           </p:cNvPr>
@@ -1453,7 +1453,7 @@
           <p:cNvPr id="7" name="Foliennummernplatzhalter 6">
             <a:extLst>
               <a:ext uri="{FF2B5EF4-FFF2-40B4-BE49-F238E27FC236}">
-                <a16:creationId xmlns:a16="http://schemas.microsoft.com/office/drawing/2014/main" xmlns="" id="{C6E78758-3222-4D07-99E8-90C511E4952D}"/>
+                <a16:creationId xmlns:a16="http://schemas.microsoft.com/office/drawing/2014/main" id="{C6E78758-3222-4D07-99E8-90C511E4952D}"/>
               </a:ext>
             </a:extLst>
           </p:cNvPr>
@@ -1512,7 +1512,7 @@
           <p:cNvPr id="2" name="Titel 1">
             <a:extLst>
               <a:ext uri="{FF2B5EF4-FFF2-40B4-BE49-F238E27FC236}">
-                <a16:creationId xmlns:a16="http://schemas.microsoft.com/office/drawing/2014/main" xmlns="" id="{266C159D-B675-441B-B436-5E98B13279DC}"/>
+                <a16:creationId xmlns:a16="http://schemas.microsoft.com/office/drawing/2014/main" id="{266C159D-B675-441B-B436-5E98B13279DC}"/>
               </a:ext>
             </a:extLst>
           </p:cNvPr>
@@ -1545,7 +1545,7 @@
           <p:cNvPr id="3" name="Textplatzhalter 2">
             <a:extLst>
               <a:ext uri="{FF2B5EF4-FFF2-40B4-BE49-F238E27FC236}">
-                <a16:creationId xmlns:a16="http://schemas.microsoft.com/office/drawing/2014/main" xmlns="" id="{5EAD995C-2D38-4568-B4BB-184107954169}"/>
+                <a16:creationId xmlns:a16="http://schemas.microsoft.com/office/drawing/2014/main" id="{5EAD995C-2D38-4568-B4BB-184107954169}"/>
               </a:ext>
             </a:extLst>
           </p:cNvPr>
@@ -1616,7 +1616,7 @@
           <p:cNvPr id="4" name="Inhaltsplatzhalter 3">
             <a:extLst>
               <a:ext uri="{FF2B5EF4-FFF2-40B4-BE49-F238E27FC236}">
-                <a16:creationId xmlns:a16="http://schemas.microsoft.com/office/drawing/2014/main" xmlns="" id="{202D1B48-1F0E-4EBC-B7C0-37F939AF5FFE}"/>
+                <a16:creationId xmlns:a16="http://schemas.microsoft.com/office/drawing/2014/main" id="{202D1B48-1F0E-4EBC-B7C0-37F939AF5FFE}"/>
               </a:ext>
             </a:extLst>
           </p:cNvPr>
@@ -1678,7 +1678,7 @@
           <p:cNvPr id="5" name="Textplatzhalter 4">
             <a:extLst>
               <a:ext uri="{FF2B5EF4-FFF2-40B4-BE49-F238E27FC236}">
-                <a16:creationId xmlns:a16="http://schemas.microsoft.com/office/drawing/2014/main" xmlns="" id="{2586D757-E16D-4FDB-ADBB-83E453E9D595}"/>
+                <a16:creationId xmlns:a16="http://schemas.microsoft.com/office/drawing/2014/main" id="{2586D757-E16D-4FDB-ADBB-83E453E9D595}"/>
               </a:ext>
             </a:extLst>
           </p:cNvPr>
@@ -1749,7 +1749,7 @@
           <p:cNvPr id="6" name="Inhaltsplatzhalter 5">
             <a:extLst>
               <a:ext uri="{FF2B5EF4-FFF2-40B4-BE49-F238E27FC236}">
-                <a16:creationId xmlns:a16="http://schemas.microsoft.com/office/drawing/2014/main" xmlns="" id="{45F34C61-A1ED-4475-B11E-A4D6DD469960}"/>
+                <a16:creationId xmlns:a16="http://schemas.microsoft.com/office/drawing/2014/main" id="{45F34C61-A1ED-4475-B11E-A4D6DD469960}"/>
               </a:ext>
             </a:extLst>
           </p:cNvPr>
@@ -1811,7 +1811,7 @@
           <p:cNvPr id="7" name="Datumsplatzhalter 6">
             <a:extLst>
               <a:ext uri="{FF2B5EF4-FFF2-40B4-BE49-F238E27FC236}">
-                <a16:creationId xmlns:a16="http://schemas.microsoft.com/office/drawing/2014/main" xmlns="" id="{07D51B86-67AB-4BE6-8BA7-D254888171B3}"/>
+                <a16:creationId xmlns:a16="http://schemas.microsoft.com/office/drawing/2014/main" id="{07D51B86-67AB-4BE6-8BA7-D254888171B3}"/>
               </a:ext>
             </a:extLst>
           </p:cNvPr>
@@ -1829,7 +1829,7 @@
           <a:p>
             <a:fld id="{61DCF2AA-3565-4A8F-AEB7-BBCC4D9D8BE9}" type="datetimeFigureOut">
               <a:rPr lang="de-DE" smtClean="0"/>
-              <a:t>28.01.2021</a:t>
+              <a:t>29.01.2021</a:t>
             </a:fld>
             <a:endParaRPr lang="de-DE"/>
           </a:p>
@@ -1840,7 +1840,7 @@
           <p:cNvPr id="8" name="Fußzeilenplatzhalter 7">
             <a:extLst>
               <a:ext uri="{FF2B5EF4-FFF2-40B4-BE49-F238E27FC236}">
-                <a16:creationId xmlns:a16="http://schemas.microsoft.com/office/drawing/2014/main" xmlns="" id="{90CB3AF4-94E6-4A4E-B6BC-D3DD554ECDB4}"/>
+                <a16:creationId xmlns:a16="http://schemas.microsoft.com/office/drawing/2014/main" id="{90CB3AF4-94E6-4A4E-B6BC-D3DD554ECDB4}"/>
               </a:ext>
             </a:extLst>
           </p:cNvPr>
@@ -1865,7 +1865,7 @@
           <p:cNvPr id="9" name="Foliennummernplatzhalter 8">
             <a:extLst>
               <a:ext uri="{FF2B5EF4-FFF2-40B4-BE49-F238E27FC236}">
-                <a16:creationId xmlns:a16="http://schemas.microsoft.com/office/drawing/2014/main" xmlns="" id="{0712711E-3A93-4D9A-8FFE-8E2757DB1F67}"/>
+                <a16:creationId xmlns:a16="http://schemas.microsoft.com/office/drawing/2014/main" id="{0712711E-3A93-4D9A-8FFE-8E2757DB1F67}"/>
               </a:ext>
             </a:extLst>
           </p:cNvPr>
@@ -1924,7 +1924,7 @@
           <p:cNvPr id="2" name="Titel 1">
             <a:extLst>
               <a:ext uri="{FF2B5EF4-FFF2-40B4-BE49-F238E27FC236}">
-                <a16:creationId xmlns:a16="http://schemas.microsoft.com/office/drawing/2014/main" xmlns="" id="{79CB0853-9117-44EF-9036-5F692FBA867B}"/>
+                <a16:creationId xmlns:a16="http://schemas.microsoft.com/office/drawing/2014/main" id="{79CB0853-9117-44EF-9036-5F692FBA867B}"/>
               </a:ext>
             </a:extLst>
           </p:cNvPr>
@@ -1952,7 +1952,7 @@
           <p:cNvPr id="3" name="Datumsplatzhalter 2">
             <a:extLst>
               <a:ext uri="{FF2B5EF4-FFF2-40B4-BE49-F238E27FC236}">
-                <a16:creationId xmlns:a16="http://schemas.microsoft.com/office/drawing/2014/main" xmlns="" id="{145709F5-67DA-4975-8386-C59B80B8A8A8}"/>
+                <a16:creationId xmlns:a16="http://schemas.microsoft.com/office/drawing/2014/main" id="{145709F5-67DA-4975-8386-C59B80B8A8A8}"/>
               </a:ext>
             </a:extLst>
           </p:cNvPr>
@@ -1970,7 +1970,7 @@
           <a:p>
             <a:fld id="{61DCF2AA-3565-4A8F-AEB7-BBCC4D9D8BE9}" type="datetimeFigureOut">
               <a:rPr lang="de-DE" smtClean="0"/>
-              <a:t>28.01.2021</a:t>
+              <a:t>29.01.2021</a:t>
             </a:fld>
             <a:endParaRPr lang="de-DE"/>
           </a:p>
@@ -1981,7 +1981,7 @@
           <p:cNvPr id="4" name="Fußzeilenplatzhalter 3">
             <a:extLst>
               <a:ext uri="{FF2B5EF4-FFF2-40B4-BE49-F238E27FC236}">
-                <a16:creationId xmlns:a16="http://schemas.microsoft.com/office/drawing/2014/main" xmlns="" id="{A58CA182-0174-4425-AA14-CE21DE508906}"/>
+                <a16:creationId xmlns:a16="http://schemas.microsoft.com/office/drawing/2014/main" id="{A58CA182-0174-4425-AA14-CE21DE508906}"/>
               </a:ext>
             </a:extLst>
           </p:cNvPr>
@@ -2006,7 +2006,7 @@
           <p:cNvPr id="5" name="Foliennummernplatzhalter 4">
             <a:extLst>
               <a:ext uri="{FF2B5EF4-FFF2-40B4-BE49-F238E27FC236}">
-                <a16:creationId xmlns:a16="http://schemas.microsoft.com/office/drawing/2014/main" xmlns="" id="{A02EF08E-3EFC-4452-8CE6-0A04EF5A7A12}"/>
+                <a16:creationId xmlns:a16="http://schemas.microsoft.com/office/drawing/2014/main" id="{A02EF08E-3EFC-4452-8CE6-0A04EF5A7A12}"/>
               </a:ext>
             </a:extLst>
           </p:cNvPr>
@@ -2065,7 +2065,7 @@
           <p:cNvPr id="2" name="Datumsplatzhalter 1">
             <a:extLst>
               <a:ext uri="{FF2B5EF4-FFF2-40B4-BE49-F238E27FC236}">
-                <a16:creationId xmlns:a16="http://schemas.microsoft.com/office/drawing/2014/main" xmlns="" id="{DCAD8910-BA4B-40EA-B408-B6530932A0AF}"/>
+                <a16:creationId xmlns:a16="http://schemas.microsoft.com/office/drawing/2014/main" id="{DCAD8910-BA4B-40EA-B408-B6530932A0AF}"/>
               </a:ext>
             </a:extLst>
           </p:cNvPr>
@@ -2083,7 +2083,7 @@
           <a:p>
             <a:fld id="{61DCF2AA-3565-4A8F-AEB7-BBCC4D9D8BE9}" type="datetimeFigureOut">
               <a:rPr lang="de-DE" smtClean="0"/>
-              <a:t>28.01.2021</a:t>
+              <a:t>29.01.2021</a:t>
             </a:fld>
             <a:endParaRPr lang="de-DE"/>
           </a:p>
@@ -2094,7 +2094,7 @@
           <p:cNvPr id="3" name="Fußzeilenplatzhalter 2">
             <a:extLst>
               <a:ext uri="{FF2B5EF4-FFF2-40B4-BE49-F238E27FC236}">
-                <a16:creationId xmlns:a16="http://schemas.microsoft.com/office/drawing/2014/main" xmlns="" id="{2CEFC895-DD25-4054-A0B1-6FE086192BEC}"/>
+                <a16:creationId xmlns:a16="http://schemas.microsoft.com/office/drawing/2014/main" id="{2CEFC895-DD25-4054-A0B1-6FE086192BEC}"/>
               </a:ext>
             </a:extLst>
           </p:cNvPr>
@@ -2119,7 +2119,7 @@
           <p:cNvPr id="4" name="Foliennummernplatzhalter 3">
             <a:extLst>
               <a:ext uri="{FF2B5EF4-FFF2-40B4-BE49-F238E27FC236}">
-                <a16:creationId xmlns:a16="http://schemas.microsoft.com/office/drawing/2014/main" xmlns="" id="{C62B1C5F-101E-4692-BE93-F348A868B647}"/>
+                <a16:creationId xmlns:a16="http://schemas.microsoft.com/office/drawing/2014/main" id="{C62B1C5F-101E-4692-BE93-F348A868B647}"/>
               </a:ext>
             </a:extLst>
           </p:cNvPr>
@@ -2178,7 +2178,7 @@
           <p:cNvPr id="2" name="Titel 1">
             <a:extLst>
               <a:ext uri="{FF2B5EF4-FFF2-40B4-BE49-F238E27FC236}">
-                <a16:creationId xmlns:a16="http://schemas.microsoft.com/office/drawing/2014/main" xmlns="" id="{D4C9A2BA-51DC-4C7F-BFEE-7E977C6C0080}"/>
+                <a16:creationId xmlns:a16="http://schemas.microsoft.com/office/drawing/2014/main" id="{D4C9A2BA-51DC-4C7F-BFEE-7E977C6C0080}"/>
               </a:ext>
             </a:extLst>
           </p:cNvPr>
@@ -2215,7 +2215,7 @@
           <p:cNvPr id="3" name="Inhaltsplatzhalter 2">
             <a:extLst>
               <a:ext uri="{FF2B5EF4-FFF2-40B4-BE49-F238E27FC236}">
-                <a16:creationId xmlns:a16="http://schemas.microsoft.com/office/drawing/2014/main" xmlns="" id="{F5584F75-D77D-4666-B1FC-7711B721E0C2}"/>
+                <a16:creationId xmlns:a16="http://schemas.microsoft.com/office/drawing/2014/main" id="{F5584F75-D77D-4666-B1FC-7711B721E0C2}"/>
               </a:ext>
             </a:extLst>
           </p:cNvPr>
@@ -2305,7 +2305,7 @@
           <p:cNvPr id="4" name="Textplatzhalter 3">
             <a:extLst>
               <a:ext uri="{FF2B5EF4-FFF2-40B4-BE49-F238E27FC236}">
-                <a16:creationId xmlns:a16="http://schemas.microsoft.com/office/drawing/2014/main" xmlns="" id="{E3B6F105-4E0E-46A9-A847-89AE38B3E6D1}"/>
+                <a16:creationId xmlns:a16="http://schemas.microsoft.com/office/drawing/2014/main" id="{E3B6F105-4E0E-46A9-A847-89AE38B3E6D1}"/>
               </a:ext>
             </a:extLst>
           </p:cNvPr>
@@ -2376,7 +2376,7 @@
           <p:cNvPr id="5" name="Datumsplatzhalter 4">
             <a:extLst>
               <a:ext uri="{FF2B5EF4-FFF2-40B4-BE49-F238E27FC236}">
-                <a16:creationId xmlns:a16="http://schemas.microsoft.com/office/drawing/2014/main" xmlns="" id="{48D56900-1BF7-4D33-9D36-16F55D29FC6E}"/>
+                <a16:creationId xmlns:a16="http://schemas.microsoft.com/office/drawing/2014/main" id="{48D56900-1BF7-4D33-9D36-16F55D29FC6E}"/>
               </a:ext>
             </a:extLst>
           </p:cNvPr>
@@ -2394,7 +2394,7 @@
           <a:p>
             <a:fld id="{61DCF2AA-3565-4A8F-AEB7-BBCC4D9D8BE9}" type="datetimeFigureOut">
               <a:rPr lang="de-DE" smtClean="0"/>
-              <a:t>28.01.2021</a:t>
+              <a:t>29.01.2021</a:t>
             </a:fld>
             <a:endParaRPr lang="de-DE"/>
           </a:p>
@@ -2405,7 +2405,7 @@
           <p:cNvPr id="6" name="Fußzeilenplatzhalter 5">
             <a:extLst>
               <a:ext uri="{FF2B5EF4-FFF2-40B4-BE49-F238E27FC236}">
-                <a16:creationId xmlns:a16="http://schemas.microsoft.com/office/drawing/2014/main" xmlns="" id="{1A7A2A42-6398-4FA3-B598-79193AB07A80}"/>
+                <a16:creationId xmlns:a16="http://schemas.microsoft.com/office/drawing/2014/main" id="{1A7A2A42-6398-4FA3-B598-79193AB07A80}"/>
               </a:ext>
             </a:extLst>
           </p:cNvPr>
@@ -2430,7 +2430,7 @@
           <p:cNvPr id="7" name="Foliennummernplatzhalter 6">
             <a:extLst>
               <a:ext uri="{FF2B5EF4-FFF2-40B4-BE49-F238E27FC236}">
-                <a16:creationId xmlns:a16="http://schemas.microsoft.com/office/drawing/2014/main" xmlns="" id="{726E82F1-820A-4AEE-82AF-F836B70666A4}"/>
+                <a16:creationId xmlns:a16="http://schemas.microsoft.com/office/drawing/2014/main" id="{726E82F1-820A-4AEE-82AF-F836B70666A4}"/>
               </a:ext>
             </a:extLst>
           </p:cNvPr>
@@ -2489,7 +2489,7 @@
           <p:cNvPr id="2" name="Titel 1">
             <a:extLst>
               <a:ext uri="{FF2B5EF4-FFF2-40B4-BE49-F238E27FC236}">
-                <a16:creationId xmlns:a16="http://schemas.microsoft.com/office/drawing/2014/main" xmlns="" id="{91B47CF9-120F-41E3-9490-CD89CC42EADB}"/>
+                <a16:creationId xmlns:a16="http://schemas.microsoft.com/office/drawing/2014/main" id="{91B47CF9-120F-41E3-9490-CD89CC42EADB}"/>
               </a:ext>
             </a:extLst>
           </p:cNvPr>
@@ -2526,7 +2526,7 @@
           <p:cNvPr id="3" name="Bildplatzhalter 2">
             <a:extLst>
               <a:ext uri="{FF2B5EF4-FFF2-40B4-BE49-F238E27FC236}">
-                <a16:creationId xmlns:a16="http://schemas.microsoft.com/office/drawing/2014/main" xmlns="" id="{BE762C8A-E1AF-473A-95E1-C862CA605C15}"/>
+                <a16:creationId xmlns:a16="http://schemas.microsoft.com/office/drawing/2014/main" id="{BE762C8A-E1AF-473A-95E1-C862CA605C15}"/>
               </a:ext>
             </a:extLst>
           </p:cNvPr>
@@ -2593,7 +2593,7 @@
           <p:cNvPr id="4" name="Textplatzhalter 3">
             <a:extLst>
               <a:ext uri="{FF2B5EF4-FFF2-40B4-BE49-F238E27FC236}">
-                <a16:creationId xmlns:a16="http://schemas.microsoft.com/office/drawing/2014/main" xmlns="" id="{3E20B71F-EB74-4102-95A1-53AC0DF8FB14}"/>
+                <a16:creationId xmlns:a16="http://schemas.microsoft.com/office/drawing/2014/main" id="{3E20B71F-EB74-4102-95A1-53AC0DF8FB14}"/>
               </a:ext>
             </a:extLst>
           </p:cNvPr>
@@ -2664,7 +2664,7 @@
           <p:cNvPr id="5" name="Datumsplatzhalter 4">
             <a:extLst>
               <a:ext uri="{FF2B5EF4-FFF2-40B4-BE49-F238E27FC236}">
-                <a16:creationId xmlns:a16="http://schemas.microsoft.com/office/drawing/2014/main" xmlns="" id="{2A18AC28-E07E-4D56-A30C-7B8F159393A9}"/>
+                <a16:creationId xmlns:a16="http://schemas.microsoft.com/office/drawing/2014/main" id="{2A18AC28-E07E-4D56-A30C-7B8F159393A9}"/>
               </a:ext>
             </a:extLst>
           </p:cNvPr>
@@ -2682,7 +2682,7 @@
           <a:p>
             <a:fld id="{61DCF2AA-3565-4A8F-AEB7-BBCC4D9D8BE9}" type="datetimeFigureOut">
               <a:rPr lang="de-DE" smtClean="0"/>
-              <a:t>28.01.2021</a:t>
+              <a:t>29.01.2021</a:t>
             </a:fld>
             <a:endParaRPr lang="de-DE"/>
           </a:p>
@@ -2693,7 +2693,7 @@
           <p:cNvPr id="6" name="Fußzeilenplatzhalter 5">
             <a:extLst>
               <a:ext uri="{FF2B5EF4-FFF2-40B4-BE49-F238E27FC236}">
-                <a16:creationId xmlns:a16="http://schemas.microsoft.com/office/drawing/2014/main" xmlns="" id="{8AAD20C6-74DC-439C-BA20-240AE6C0E49B}"/>
+                <a16:creationId xmlns:a16="http://schemas.microsoft.com/office/drawing/2014/main" id="{8AAD20C6-74DC-439C-BA20-240AE6C0E49B}"/>
               </a:ext>
             </a:extLst>
           </p:cNvPr>
@@ -2718,7 +2718,7 @@
           <p:cNvPr id="7" name="Foliennummernplatzhalter 6">
             <a:extLst>
               <a:ext uri="{FF2B5EF4-FFF2-40B4-BE49-F238E27FC236}">
-                <a16:creationId xmlns:a16="http://schemas.microsoft.com/office/drawing/2014/main" xmlns="" id="{C464A28D-2088-4FDE-BD6A-4331D6124899}"/>
+                <a16:creationId xmlns:a16="http://schemas.microsoft.com/office/drawing/2014/main" id="{C464A28D-2088-4FDE-BD6A-4331D6124899}"/>
               </a:ext>
             </a:extLst>
           </p:cNvPr>
@@ -2782,7 +2782,7 @@
           <p:cNvPr id="2" name="Titelplatzhalter 1">
             <a:extLst>
               <a:ext uri="{FF2B5EF4-FFF2-40B4-BE49-F238E27FC236}">
-                <a16:creationId xmlns:a16="http://schemas.microsoft.com/office/drawing/2014/main" xmlns="" id="{F71C5E7D-69D6-42F1-A321-44D3F127C8E7}"/>
+                <a16:creationId xmlns:a16="http://schemas.microsoft.com/office/drawing/2014/main" id="{F71C5E7D-69D6-42F1-A321-44D3F127C8E7}"/>
               </a:ext>
             </a:extLst>
           </p:cNvPr>
@@ -2820,7 +2820,7 @@
           <p:cNvPr id="3" name="Textplatzhalter 2">
             <a:extLst>
               <a:ext uri="{FF2B5EF4-FFF2-40B4-BE49-F238E27FC236}">
-                <a16:creationId xmlns:a16="http://schemas.microsoft.com/office/drawing/2014/main" xmlns="" id="{1C97E5ED-2862-4EAB-B925-557E03E5CEF8}"/>
+                <a16:creationId xmlns:a16="http://schemas.microsoft.com/office/drawing/2014/main" id="{1C97E5ED-2862-4EAB-B925-557E03E5CEF8}"/>
               </a:ext>
             </a:extLst>
           </p:cNvPr>
@@ -2887,7 +2887,7 @@
           <p:cNvPr id="4" name="Datumsplatzhalter 3">
             <a:extLst>
               <a:ext uri="{FF2B5EF4-FFF2-40B4-BE49-F238E27FC236}">
-                <a16:creationId xmlns:a16="http://schemas.microsoft.com/office/drawing/2014/main" xmlns="" id="{E8F85EF0-AD19-450F-A3BD-9DAF2E6FF2CA}"/>
+                <a16:creationId xmlns:a16="http://schemas.microsoft.com/office/drawing/2014/main" id="{E8F85EF0-AD19-450F-A3BD-9DAF2E6FF2CA}"/>
               </a:ext>
             </a:extLst>
           </p:cNvPr>
@@ -2923,7 +2923,7 @@
           <a:p>
             <a:fld id="{61DCF2AA-3565-4A8F-AEB7-BBCC4D9D8BE9}" type="datetimeFigureOut">
               <a:rPr lang="de-DE" smtClean="0"/>
-              <a:t>28.01.2021</a:t>
+              <a:t>29.01.2021</a:t>
             </a:fld>
             <a:endParaRPr lang="de-DE"/>
           </a:p>
@@ -2934,7 +2934,7 @@
           <p:cNvPr id="5" name="Fußzeilenplatzhalter 4">
             <a:extLst>
               <a:ext uri="{FF2B5EF4-FFF2-40B4-BE49-F238E27FC236}">
-                <a16:creationId xmlns:a16="http://schemas.microsoft.com/office/drawing/2014/main" xmlns="" id="{7293A5BD-EC44-45DE-AB05-0FF6BEE96393}"/>
+                <a16:creationId xmlns:a16="http://schemas.microsoft.com/office/drawing/2014/main" id="{7293A5BD-EC44-45DE-AB05-0FF6BEE96393}"/>
               </a:ext>
             </a:extLst>
           </p:cNvPr>
@@ -2977,7 +2977,7 @@
           <p:cNvPr id="6" name="Foliennummernplatzhalter 5">
             <a:extLst>
               <a:ext uri="{FF2B5EF4-FFF2-40B4-BE49-F238E27FC236}">
-                <a16:creationId xmlns:a16="http://schemas.microsoft.com/office/drawing/2014/main" xmlns="" id="{784C9FE9-D21F-4D9B-9E07-2B00F1E0E955}"/>
+                <a16:creationId xmlns:a16="http://schemas.microsoft.com/office/drawing/2014/main" id="{784C9FE9-D21F-4D9B-9E07-2B00F1E0E955}"/>
               </a:ext>
             </a:extLst>
           </p:cNvPr>
@@ -3345,7 +3345,7 @@
           <p:cNvPr id="1026" name="Picture 2" descr="Outdoor playground ai, eps file | free graphics | UIHere">
             <a:extLst>
               <a:ext uri="{FF2B5EF4-FFF2-40B4-BE49-F238E27FC236}">
-                <a16:creationId xmlns:a16="http://schemas.microsoft.com/office/drawing/2014/main" xmlns="" id="{F72638B5-BB95-4001-9CDC-209DF3657A99}"/>
+                <a16:creationId xmlns:a16="http://schemas.microsoft.com/office/drawing/2014/main" id="{F72638B5-BB95-4001-9CDC-209DF3657A99}"/>
               </a:ext>
             </a:extLst>
           </p:cNvPr>
@@ -3392,7 +3392,7 @@
           <p:cNvPr id="2" name="Titel 1">
             <a:extLst>
               <a:ext uri="{FF2B5EF4-FFF2-40B4-BE49-F238E27FC236}">
-                <a16:creationId xmlns:a16="http://schemas.microsoft.com/office/drawing/2014/main" xmlns="" id="{05F99161-2719-443B-83DF-B35A3F5108CA}"/>
+                <a16:creationId xmlns:a16="http://schemas.microsoft.com/office/drawing/2014/main" id="{05F99161-2719-443B-83DF-B35A3F5108CA}"/>
               </a:ext>
             </a:extLst>
           </p:cNvPr>
@@ -3425,7 +3425,7 @@
           <p:cNvPr id="3" name="Untertitel 2">
             <a:extLst>
               <a:ext uri="{FF2B5EF4-FFF2-40B4-BE49-F238E27FC236}">
-                <a16:creationId xmlns:a16="http://schemas.microsoft.com/office/drawing/2014/main" xmlns="" id="{1BACD806-0FB6-4E15-8B7C-C34E643D5424}"/>
+                <a16:creationId xmlns:a16="http://schemas.microsoft.com/office/drawing/2014/main" id="{1BACD806-0FB6-4E15-8B7C-C34E643D5424}"/>
               </a:ext>
             </a:extLst>
           </p:cNvPr>
@@ -3445,6 +3445,44 @@
               <a:rPr lang="de-DE" dirty="0"/>
               <a:t>A Java Project</a:t>
             </a:r>
+          </a:p>
+        </p:txBody>
+      </p:sp>
+      <p:sp>
+        <p:nvSpPr>
+          <p:cNvPr id="5" name="Textfeld 4">
+            <a:extLst>
+              <a:ext uri="{FF2B5EF4-FFF2-40B4-BE49-F238E27FC236}">
+                <a16:creationId xmlns:a16="http://schemas.microsoft.com/office/drawing/2014/main" id="{AD8C09EB-37A2-4FC7-A7F9-EE77FC7AA516}"/>
+              </a:ext>
+            </a:extLst>
+          </p:cNvPr>
+          <p:cNvSpPr txBox="1"/>
+          <p:nvPr/>
+        </p:nvSpPr>
+        <p:spPr>
+          <a:xfrm>
+            <a:off x="0" y="6488668"/>
+            <a:ext cx="5470775" cy="369332"/>
+          </a:xfrm>
+          <a:prstGeom prst="rect">
+            <a:avLst/>
+          </a:prstGeom>
+          <a:noFill/>
+        </p:spPr>
+        <p:txBody>
+          <a:bodyPr wrap="square" rtlCol="0">
+            <a:spAutoFit/>
+          </a:bodyPr>
+          <a:lstStyle/>
+          <a:p>
+            <a:r>
+              <a:rPr lang="de-DE" dirty="0">
+                <a:sym typeface="Wingdings" panose="05000000000000000000" pitchFamily="2" charset="2"/>
+              </a:rPr>
+              <a:t> https://github.com/fh-erfurt/Project-Playground</a:t>
+            </a:r>
+            <a:endParaRPr lang="de-DE" dirty="0"/>
           </a:p>
         </p:txBody>
       </p:sp>
@@ -3458,13 +3496,6 @@
   <p:clrMapOvr>
     <a:masterClrMapping/>
   </p:clrMapOvr>
-  <p:timing>
-    <p:tnLst>
-      <p:par>
-        <p:cTn id="1" dur="indefinite" restart="never" nodeType="tmRoot"/>
-      </p:par>
-    </p:tnLst>
-  </p:timing>
 </p:sld>
 </file>
 
@@ -3490,7 +3521,7 @@
           <p:cNvPr id="2" name="Titel 1">
             <a:extLst>
               <a:ext uri="{FF2B5EF4-FFF2-40B4-BE49-F238E27FC236}">
-                <a16:creationId xmlns:a16="http://schemas.microsoft.com/office/drawing/2014/main" xmlns="" id="{7591A35D-7DDB-4AFA-907F-94356CD7A646}"/>
+                <a16:creationId xmlns:a16="http://schemas.microsoft.com/office/drawing/2014/main" id="{7591A35D-7DDB-4AFA-907F-94356CD7A646}"/>
               </a:ext>
             </a:extLst>
           </p:cNvPr>
@@ -3528,7 +3559,7 @@
           <p:cNvPr id="5" name="Inhaltsplatzhalter 4">
             <a:extLst>
               <a:ext uri="{FF2B5EF4-FFF2-40B4-BE49-F238E27FC236}">
-                <a16:creationId xmlns:a16="http://schemas.microsoft.com/office/drawing/2014/main" xmlns="" id="{5068980D-4FD7-42D5-9231-3D05C2FF1CFA}"/>
+                <a16:creationId xmlns:a16="http://schemas.microsoft.com/office/drawing/2014/main" id="{5068980D-4FD7-42D5-9231-3D05C2FF1CFA}"/>
               </a:ext>
             </a:extLst>
           </p:cNvPr>
@@ -3563,7 +3594,7 @@
           <p:cNvPr id="6" name="Picture 2" descr="Outdoor playground ai, eps file | free graphics | UIHere">
             <a:extLst>
               <a:ext uri="{FF2B5EF4-FFF2-40B4-BE49-F238E27FC236}">
-                <a16:creationId xmlns:a16="http://schemas.microsoft.com/office/drawing/2014/main" xmlns="" id="{8A7AA729-265B-4C4F-92EE-E5F7D0984468}"/>
+                <a16:creationId xmlns:a16="http://schemas.microsoft.com/office/drawing/2014/main" id="{8A7AA729-265B-4C4F-92EE-E5F7D0984468}"/>
               </a:ext>
             </a:extLst>
           </p:cNvPr>
@@ -3640,7 +3671,7 @@
           <p:cNvPr id="2" name="Titel 1">
             <a:extLst>
               <a:ext uri="{FF2B5EF4-FFF2-40B4-BE49-F238E27FC236}">
-                <a16:creationId xmlns:a16="http://schemas.microsoft.com/office/drawing/2014/main" xmlns="" id="{EA5C2A5E-4188-4CCA-A28B-2FD9FBB73E8F}"/>
+                <a16:creationId xmlns:a16="http://schemas.microsoft.com/office/drawing/2014/main" id="{EA5C2A5E-4188-4CCA-A28B-2FD9FBB73E8F}"/>
               </a:ext>
             </a:extLst>
           </p:cNvPr>
@@ -3678,7 +3709,7 @@
           <p:cNvPr id="5" name="Inhaltsplatzhalter 4">
             <a:extLst>
               <a:ext uri="{FF2B5EF4-FFF2-40B4-BE49-F238E27FC236}">
-                <a16:creationId xmlns:a16="http://schemas.microsoft.com/office/drawing/2014/main" xmlns="" id="{60FC8D97-78BF-4988-853E-22B13E5BA398}"/>
+                <a16:creationId xmlns:a16="http://schemas.microsoft.com/office/drawing/2014/main" id="{60FC8D97-78BF-4988-853E-22B13E5BA398}"/>
               </a:ext>
             </a:extLst>
           </p:cNvPr>
@@ -3713,7 +3744,7 @@
           <p:cNvPr id="6" name="Picture 2" descr="Outdoor playground ai, eps file | free graphics | UIHere">
             <a:extLst>
               <a:ext uri="{FF2B5EF4-FFF2-40B4-BE49-F238E27FC236}">
-                <a16:creationId xmlns:a16="http://schemas.microsoft.com/office/drawing/2014/main" xmlns="" id="{8C8FEBD9-21E3-45D3-B8E6-0B7E207BF2F3}"/>
+                <a16:creationId xmlns:a16="http://schemas.microsoft.com/office/drawing/2014/main" id="{8C8FEBD9-21E3-45D3-B8E6-0B7E207BF2F3}"/>
               </a:ext>
             </a:extLst>
           </p:cNvPr>
@@ -3790,7 +3821,7 @@
           <p:cNvPr id="2" name="Titel 1">
             <a:extLst>
               <a:ext uri="{FF2B5EF4-FFF2-40B4-BE49-F238E27FC236}">
-                <a16:creationId xmlns:a16="http://schemas.microsoft.com/office/drawing/2014/main" xmlns="" id="{E50AB8E4-0252-4904-9DA6-1DB39D5F82C4}"/>
+                <a16:creationId xmlns:a16="http://schemas.microsoft.com/office/drawing/2014/main" id="{E50AB8E4-0252-4904-9DA6-1DB39D5F82C4}"/>
               </a:ext>
             </a:extLst>
           </p:cNvPr>
@@ -3828,7 +3859,7 @@
           <p:cNvPr id="5" name="Inhaltsplatzhalter 4">
             <a:extLst>
               <a:ext uri="{FF2B5EF4-FFF2-40B4-BE49-F238E27FC236}">
-                <a16:creationId xmlns:a16="http://schemas.microsoft.com/office/drawing/2014/main" xmlns="" id="{58E254C5-4CD2-42A2-8371-4FA42F44D862}"/>
+                <a16:creationId xmlns:a16="http://schemas.microsoft.com/office/drawing/2014/main" id="{58E254C5-4CD2-42A2-8371-4FA42F44D862}"/>
               </a:ext>
             </a:extLst>
           </p:cNvPr>
@@ -3863,7 +3894,7 @@
           <p:cNvPr id="6" name="Picture 2" descr="Outdoor playground ai, eps file | free graphics | UIHere">
             <a:extLst>
               <a:ext uri="{FF2B5EF4-FFF2-40B4-BE49-F238E27FC236}">
-                <a16:creationId xmlns:a16="http://schemas.microsoft.com/office/drawing/2014/main" xmlns="" id="{713F3554-9587-4882-8CC5-C29E9F4B344E}"/>
+                <a16:creationId xmlns:a16="http://schemas.microsoft.com/office/drawing/2014/main" id="{713F3554-9587-4882-8CC5-C29E9F4B344E}"/>
               </a:ext>
             </a:extLst>
           </p:cNvPr>
@@ -3940,7 +3971,7 @@
           <p:cNvPr id="4" name="Picture 2" descr="Outdoor playground ai, eps file | free graphics | UIHere">
             <a:extLst>
               <a:ext uri="{FF2B5EF4-FFF2-40B4-BE49-F238E27FC236}">
-                <a16:creationId xmlns:a16="http://schemas.microsoft.com/office/drawing/2014/main" xmlns="" id="{06FC61CE-77B4-490A-98C6-934F5F543D6C}"/>
+                <a16:creationId xmlns:a16="http://schemas.microsoft.com/office/drawing/2014/main" id="{06FC61CE-77B4-490A-98C6-934F5F543D6C}"/>
               </a:ext>
             </a:extLst>
           </p:cNvPr>
@@ -3987,7 +4018,7 @@
           <p:cNvPr id="2" name="Titel 1">
             <a:extLst>
               <a:ext uri="{FF2B5EF4-FFF2-40B4-BE49-F238E27FC236}">
-                <a16:creationId xmlns:a16="http://schemas.microsoft.com/office/drawing/2014/main" xmlns="" id="{B2ED9C9A-7703-4338-984B-733796CEEE5E}"/>
+                <a16:creationId xmlns:a16="http://schemas.microsoft.com/office/drawing/2014/main" id="{B2ED9C9A-7703-4338-984B-733796CEEE5E}"/>
               </a:ext>
             </a:extLst>
           </p:cNvPr>
@@ -4024,7 +4055,7 @@
           <p:cNvPr id="3" name="Inhaltsplatzhalter 2">
             <a:extLst>
               <a:ext uri="{FF2B5EF4-FFF2-40B4-BE49-F238E27FC236}">
-                <a16:creationId xmlns:a16="http://schemas.microsoft.com/office/drawing/2014/main" xmlns="" id="{0EF665D7-8943-4D4B-8CA0-99E7B5FAD9D7}"/>
+                <a16:creationId xmlns:a16="http://schemas.microsoft.com/office/drawing/2014/main" id="{0EF665D7-8943-4D4B-8CA0-99E7B5FAD9D7}"/>
               </a:ext>
             </a:extLst>
           </p:cNvPr>
@@ -4174,7 +4205,7 @@
           <p:cNvPr id="4" name="Picture 2" descr="Outdoor playground ai, eps file | free graphics | UIHere">
             <a:extLst>
               <a:ext uri="{FF2B5EF4-FFF2-40B4-BE49-F238E27FC236}">
-                <a16:creationId xmlns:a16="http://schemas.microsoft.com/office/drawing/2014/main" xmlns="" id="{22156364-7F1C-4877-BD86-72E429296C07}"/>
+                <a16:creationId xmlns:a16="http://schemas.microsoft.com/office/drawing/2014/main" id="{22156364-7F1C-4877-BD86-72E429296C07}"/>
               </a:ext>
             </a:extLst>
           </p:cNvPr>
@@ -4343,7 +4374,7 @@
           <p:cNvPr id="2" name="Titel 1">
             <a:extLst>
               <a:ext uri="{FF2B5EF4-FFF2-40B4-BE49-F238E27FC236}">
-                <a16:creationId xmlns:a16="http://schemas.microsoft.com/office/drawing/2014/main" xmlns="" id="{D58C6BB3-C481-4786-A175-DFC732F45489}"/>
+                <a16:creationId xmlns:a16="http://schemas.microsoft.com/office/drawing/2014/main" id="{D58C6BB3-C481-4786-A175-DFC732F45489}"/>
               </a:ext>
             </a:extLst>
           </p:cNvPr>
@@ -4371,7 +4402,7 @@
           <p:cNvPr id="4" name="Picture 2" descr="Outdoor playground ai, eps file | free graphics | UIHere">
             <a:extLst>
               <a:ext uri="{FF2B5EF4-FFF2-40B4-BE49-F238E27FC236}">
-                <a16:creationId xmlns:a16="http://schemas.microsoft.com/office/drawing/2014/main" xmlns="" id="{0BDE8E05-DFB1-4E85-88AA-310F3DFE66C0}"/>
+                <a16:creationId xmlns:a16="http://schemas.microsoft.com/office/drawing/2014/main" id="{0BDE8E05-DFB1-4E85-88AA-310F3DFE66C0}"/>
               </a:ext>
             </a:extLst>
           </p:cNvPr>
@@ -4418,7 +4449,7 @@
           <p:cNvPr id="2050" name="Picture 2" descr="Berater Mit Fragezeichen - Consult-SK GmbH">
             <a:extLst>
               <a:ext uri="{FF2B5EF4-FFF2-40B4-BE49-F238E27FC236}">
-                <a16:creationId xmlns:a16="http://schemas.microsoft.com/office/drawing/2014/main" xmlns="" id="{67832CDE-1914-4365-8437-92D6CE119EA4}"/>
+                <a16:creationId xmlns:a16="http://schemas.microsoft.com/office/drawing/2014/main" id="{67832CDE-1914-4365-8437-92D6CE119EA4}"/>
               </a:ext>
             </a:extLst>
           </p:cNvPr>
@@ -4497,7 +4528,7 @@
           <p:cNvPr id="2" name="Titel 1">
             <a:extLst>
               <a:ext uri="{FF2B5EF4-FFF2-40B4-BE49-F238E27FC236}">
-                <a16:creationId xmlns:a16="http://schemas.microsoft.com/office/drawing/2014/main" xmlns="" id="{97B2632D-4ED6-40B1-A14D-2917E2AE5CE4}"/>
+                <a16:creationId xmlns:a16="http://schemas.microsoft.com/office/drawing/2014/main" id="{97B2632D-4ED6-40B1-A14D-2917E2AE5CE4}"/>
               </a:ext>
             </a:extLst>
           </p:cNvPr>
@@ -4525,7 +4556,7 @@
           <p:cNvPr id="3" name="Inhaltsplatzhalter 2">
             <a:extLst>
               <a:ext uri="{FF2B5EF4-FFF2-40B4-BE49-F238E27FC236}">
-                <a16:creationId xmlns:a16="http://schemas.microsoft.com/office/drawing/2014/main" xmlns="" id="{0D266B99-511C-460E-8488-57A6B90B1A7B}"/>
+                <a16:creationId xmlns:a16="http://schemas.microsoft.com/office/drawing/2014/main" id="{0D266B99-511C-460E-8488-57A6B90B1A7B}"/>
               </a:ext>
             </a:extLst>
           </p:cNvPr>
@@ -4601,7 +4632,7 @@
           <p:cNvPr id="4" name="Picture 2" descr="Outdoor playground ai, eps file | free graphics | UIHere">
             <a:extLst>
               <a:ext uri="{FF2B5EF4-FFF2-40B4-BE49-F238E27FC236}">
-                <a16:creationId xmlns:a16="http://schemas.microsoft.com/office/drawing/2014/main" xmlns="" id="{77106340-85C4-4AEF-B4FA-2B9243585748}"/>
+                <a16:creationId xmlns:a16="http://schemas.microsoft.com/office/drawing/2014/main" id="{77106340-85C4-4AEF-B4FA-2B9243585748}"/>
               </a:ext>
             </a:extLst>
           </p:cNvPr>
@@ -4653,13 +4684,6 @@
   <p:clrMapOvr>
     <a:masterClrMapping/>
   </p:clrMapOvr>
-  <p:timing>
-    <p:tnLst>
-      <p:par>
-        <p:cTn id="1" dur="indefinite" restart="never" nodeType="tmRoot"/>
-      </p:par>
-    </p:tnLst>
-  </p:timing>
 </p:sld>
 </file>
 
@@ -4685,7 +4709,7 @@
           <p:cNvPr id="2" name="Titel 1">
             <a:extLst>
               <a:ext uri="{FF2B5EF4-FFF2-40B4-BE49-F238E27FC236}">
-                <a16:creationId xmlns:a16="http://schemas.microsoft.com/office/drawing/2014/main" xmlns="" id="{B34393BB-51B5-47DE-AA5C-4A7533FCC632}"/>
+                <a16:creationId xmlns:a16="http://schemas.microsoft.com/office/drawing/2014/main" id="{B34393BB-51B5-47DE-AA5C-4A7533FCC632}"/>
               </a:ext>
             </a:extLst>
           </p:cNvPr>
@@ -4713,7 +4737,7 @@
           <p:cNvPr id="3" name="Inhaltsplatzhalter 2">
             <a:extLst>
               <a:ext uri="{FF2B5EF4-FFF2-40B4-BE49-F238E27FC236}">
-                <a16:creationId xmlns:a16="http://schemas.microsoft.com/office/drawing/2014/main" xmlns="" id="{5B11A322-3496-4708-A3C9-311345F4DBB1}"/>
+                <a16:creationId xmlns:a16="http://schemas.microsoft.com/office/drawing/2014/main" id="{5B11A322-3496-4708-A3C9-311345F4DBB1}"/>
               </a:ext>
             </a:extLst>
           </p:cNvPr>
@@ -4798,7 +4822,7 @@
           <p:cNvPr id="4" name="Picture 2" descr="Outdoor playground ai, eps file | free graphics | UIHere">
             <a:extLst>
               <a:ext uri="{FF2B5EF4-FFF2-40B4-BE49-F238E27FC236}">
-                <a16:creationId xmlns:a16="http://schemas.microsoft.com/office/drawing/2014/main" xmlns="" id="{0A9A75FD-54FD-4E04-8535-9E93D209CC9E}"/>
+                <a16:creationId xmlns:a16="http://schemas.microsoft.com/office/drawing/2014/main" id="{0A9A75FD-54FD-4E04-8535-9E93D209CC9E}"/>
               </a:ext>
             </a:extLst>
           </p:cNvPr>
@@ -4875,7 +4899,7 @@
           <p:cNvPr id="10" name="Picture 2" descr="Outdoor playground ai, eps file | free graphics | UIHere">
             <a:extLst>
               <a:ext uri="{FF2B5EF4-FFF2-40B4-BE49-F238E27FC236}">
-                <a16:creationId xmlns:a16="http://schemas.microsoft.com/office/drawing/2014/main" xmlns="" id="{7FE79BC4-8E76-4308-A9E7-781BA45F2074}"/>
+                <a16:creationId xmlns:a16="http://schemas.microsoft.com/office/drawing/2014/main" id="{7FE79BC4-8E76-4308-A9E7-781BA45F2074}"/>
               </a:ext>
             </a:extLst>
           </p:cNvPr>
@@ -4922,7 +4946,7 @@
           <p:cNvPr id="2" name="Titel 1">
             <a:extLst>
               <a:ext uri="{FF2B5EF4-FFF2-40B4-BE49-F238E27FC236}">
-                <a16:creationId xmlns:a16="http://schemas.microsoft.com/office/drawing/2014/main" xmlns="" id="{E30F574C-4CAF-47FB-BAD7-EDB5BB7C62C7}"/>
+                <a16:creationId xmlns:a16="http://schemas.microsoft.com/office/drawing/2014/main" id="{E30F574C-4CAF-47FB-BAD7-EDB5BB7C62C7}"/>
               </a:ext>
             </a:extLst>
           </p:cNvPr>
@@ -4950,7 +4974,7 @@
           <p:cNvPr id="5" name="Inhaltsplatzhalter 4">
             <a:extLst>
               <a:ext uri="{FF2B5EF4-FFF2-40B4-BE49-F238E27FC236}">
-                <a16:creationId xmlns:a16="http://schemas.microsoft.com/office/drawing/2014/main" xmlns="" id="{B2FA570D-6325-4D41-ABB8-CCE084F8ACEE}"/>
+                <a16:creationId xmlns:a16="http://schemas.microsoft.com/office/drawing/2014/main" id="{B2FA570D-6325-4D41-ABB8-CCE084F8ACEE}"/>
               </a:ext>
             </a:extLst>
           </p:cNvPr>
@@ -4985,7 +5009,7 @@
           <p:cNvPr id="9" name="Grafik 8">
             <a:extLst>
               <a:ext uri="{FF2B5EF4-FFF2-40B4-BE49-F238E27FC236}">
-                <a16:creationId xmlns:a16="http://schemas.microsoft.com/office/drawing/2014/main" xmlns="" id="{AAF1ECD2-4FBF-40BE-B2D5-8BA46F14B445}"/>
+                <a16:creationId xmlns:a16="http://schemas.microsoft.com/office/drawing/2014/main" id="{AAF1ECD2-4FBF-40BE-B2D5-8BA46F14B445}"/>
               </a:ext>
             </a:extLst>
           </p:cNvPr>
@@ -5026,13 +5050,6 @@
   <p:clrMapOvr>
     <a:masterClrMapping/>
   </p:clrMapOvr>
-  <p:timing>
-    <p:tnLst>
-      <p:par>
-        <p:cTn id="1" dur="indefinite" restart="never" nodeType="tmRoot"/>
-      </p:par>
-    </p:tnLst>
-  </p:timing>
 </p:sld>
 </file>
 
@@ -5058,7 +5075,7 @@
           <p:cNvPr id="2" name="Titel 1">
             <a:extLst>
               <a:ext uri="{FF2B5EF4-FFF2-40B4-BE49-F238E27FC236}">
-                <a16:creationId xmlns:a16="http://schemas.microsoft.com/office/drawing/2014/main" xmlns="" id="{B2ED9C9A-7703-4338-984B-733796CEEE5E}"/>
+                <a16:creationId xmlns:a16="http://schemas.microsoft.com/office/drawing/2014/main" id="{B2ED9C9A-7703-4338-984B-733796CEEE5E}"/>
               </a:ext>
             </a:extLst>
           </p:cNvPr>
@@ -5125,13 +5142,6 @@
   <p:clrMapOvr>
     <a:masterClrMapping/>
   </p:clrMapOvr>
-  <p:timing>
-    <p:tnLst>
-      <p:par>
-        <p:cTn id="1" dur="indefinite" restart="never" nodeType="tmRoot"/>
-      </p:par>
-    </p:tnLst>
-  </p:timing>
 </p:sld>
 </file>
 
@@ -5187,7 +5197,7 @@
           <p:cNvPr id="2" name="Titel 1">
             <a:extLst>
               <a:ext uri="{FF2B5EF4-FFF2-40B4-BE49-F238E27FC236}">
-                <a16:creationId xmlns:a16="http://schemas.microsoft.com/office/drawing/2014/main" xmlns="" id="{B2ED9C9A-7703-4338-984B-733796CEEE5E}"/>
+                <a16:creationId xmlns:a16="http://schemas.microsoft.com/office/drawing/2014/main" id="{B2ED9C9A-7703-4338-984B-733796CEEE5E}"/>
               </a:ext>
             </a:extLst>
           </p:cNvPr>
@@ -5225,13 +5235,6 @@
   <p:clrMapOvr>
     <a:masterClrMapping/>
   </p:clrMapOvr>
-  <p:timing>
-    <p:tnLst>
-      <p:par>
-        <p:cTn id="1" dur="indefinite" restart="never" nodeType="tmRoot"/>
-      </p:par>
-    </p:tnLst>
-  </p:timing>
 </p:sld>
 </file>
 
@@ -5257,7 +5260,7 @@
           <p:cNvPr id="2" name="Titel 1">
             <a:extLst>
               <a:ext uri="{FF2B5EF4-FFF2-40B4-BE49-F238E27FC236}">
-                <a16:creationId xmlns:a16="http://schemas.microsoft.com/office/drawing/2014/main" xmlns="" id="{B2ED9C9A-7703-4338-984B-733796CEEE5E}"/>
+                <a16:creationId xmlns:a16="http://schemas.microsoft.com/office/drawing/2014/main" id="{B2ED9C9A-7703-4338-984B-733796CEEE5E}"/>
               </a:ext>
             </a:extLst>
           </p:cNvPr>
@@ -5325,13 +5328,6 @@
   <p:clrMapOvr>
     <a:masterClrMapping/>
   </p:clrMapOvr>
-  <p:timing>
-    <p:tnLst>
-      <p:par>
-        <p:cTn id="1" dur="indefinite" restart="never" nodeType="tmRoot"/>
-      </p:par>
-    </p:tnLst>
-  </p:timing>
 </p:sld>
 </file>
 
@@ -5357,7 +5353,7 @@
           <p:cNvPr id="2" name="Titel 1">
             <a:extLst>
               <a:ext uri="{FF2B5EF4-FFF2-40B4-BE49-F238E27FC236}">
-                <a16:creationId xmlns:a16="http://schemas.microsoft.com/office/drawing/2014/main" xmlns="" id="{B2ED9C9A-7703-4338-984B-733796CEEE5E}"/>
+                <a16:creationId xmlns:a16="http://schemas.microsoft.com/office/drawing/2014/main" id="{B2ED9C9A-7703-4338-984B-733796CEEE5E}"/>
               </a:ext>
             </a:extLst>
           </p:cNvPr>
@@ -5400,7 +5396,7 @@
           <p:cNvPr id="8" name="Inhaltsplatzhalter 7">
             <a:extLst>
               <a:ext uri="{FF2B5EF4-FFF2-40B4-BE49-F238E27FC236}">
-                <a16:creationId xmlns:a16="http://schemas.microsoft.com/office/drawing/2014/main" xmlns="" id="{D13E633A-44DB-4D13-B9D9-DE01CA9F5334}"/>
+                <a16:creationId xmlns:a16="http://schemas.microsoft.com/office/drawing/2014/main" id="{D13E633A-44DB-4D13-B9D9-DE01CA9F5334}"/>
               </a:ext>
             </a:extLst>
           </p:cNvPr>
@@ -5435,7 +5431,7 @@
           <p:cNvPr id="9" name="Picture 2" descr="Outdoor playground ai, eps file | free graphics | UIHere">
             <a:extLst>
               <a:ext uri="{FF2B5EF4-FFF2-40B4-BE49-F238E27FC236}">
-                <a16:creationId xmlns:a16="http://schemas.microsoft.com/office/drawing/2014/main" xmlns="" id="{B940AA0E-D783-4222-AAFA-B1201E01B133}"/>
+                <a16:creationId xmlns:a16="http://schemas.microsoft.com/office/drawing/2014/main" id="{B940AA0E-D783-4222-AAFA-B1201E01B133}"/>
               </a:ext>
             </a:extLst>
           </p:cNvPr>
@@ -5487,13 +5483,6 @@
   <p:clrMapOvr>
     <a:masterClrMapping/>
   </p:clrMapOvr>
-  <p:timing>
-    <p:tnLst>
-      <p:par>
-        <p:cTn id="1" dur="indefinite" restart="never" nodeType="tmRoot"/>
-      </p:par>
-    </p:tnLst>
-  </p:timing>
 </p:sld>
 </file>
 
@@ -5519,7 +5508,7 @@
           <p:cNvPr id="2" name="Titel 1">
             <a:extLst>
               <a:ext uri="{FF2B5EF4-FFF2-40B4-BE49-F238E27FC236}">
-                <a16:creationId xmlns:a16="http://schemas.microsoft.com/office/drawing/2014/main" xmlns="" id="{39A53AB8-7448-4CD0-AA4E-F7451C72117F}"/>
+                <a16:creationId xmlns:a16="http://schemas.microsoft.com/office/drawing/2014/main" id="{39A53AB8-7448-4CD0-AA4E-F7451C72117F}"/>
               </a:ext>
             </a:extLst>
           </p:cNvPr>
@@ -5560,7 +5549,7 @@
           <p:cNvPr id="5" name="Inhaltsplatzhalter 4">
             <a:extLst>
               <a:ext uri="{FF2B5EF4-FFF2-40B4-BE49-F238E27FC236}">
-                <a16:creationId xmlns:a16="http://schemas.microsoft.com/office/drawing/2014/main" xmlns="" id="{D415BFEA-789B-4127-BCEA-8DB14F8F18D3}"/>
+                <a16:creationId xmlns:a16="http://schemas.microsoft.com/office/drawing/2014/main" id="{D415BFEA-789B-4127-BCEA-8DB14F8F18D3}"/>
               </a:ext>
             </a:extLst>
           </p:cNvPr>

</xml_diff>